<commit_message>
ApproveGoal/DenyGoal implemented. ViewEmployeeReport presents PendingGoals, ActiveGoals, DeniedGoals, and FailedGoals, along with each Goal's Updates. Upgrading error handling across most action methods, some still outstanding. Many Views hardened from GET query string manipulation. POSTs used for Views that require POST data only. UpdateGoal updated. Progress logic for UpdateGoal now correctly pulls old Progress, is bounded [0,100], and must be greater than or equal to the last Update's Progress. Updating most user access control checks. DateTimes have been pretty-printed. Favicon added.
</commit_message>
<xml_diff>
--- a/Resources/csci-4712-week11.pptx
+++ b/Resources/csci-4712-week11.pptx
@@ -9,7 +9,7 @@
     <p:sldMasterId id="2147483678" r:id="rId5"/>
   </p:sldMasterIdLst>
   <p:notesMasterIdLst>
-    <p:notesMasterId r:id="rId18"/>
+    <p:notesMasterId r:id="rId13"/>
   </p:notesMasterIdLst>
   <p:sldIdLst>
     <p:sldId id="262" r:id="rId6"/>
@@ -17,13 +17,8 @@
     <p:sldId id="313" r:id="rId8"/>
     <p:sldId id="320" r:id="rId9"/>
     <p:sldId id="322" r:id="rId10"/>
-    <p:sldId id="264" r:id="rId11"/>
-    <p:sldId id="315" r:id="rId12"/>
-    <p:sldId id="265" r:id="rId13"/>
-    <p:sldId id="314" r:id="rId14"/>
-    <p:sldId id="316" r:id="rId15"/>
-    <p:sldId id="317" r:id="rId16"/>
-    <p:sldId id="319" r:id="rId17"/>
+    <p:sldId id="324" r:id="rId11"/>
+    <p:sldId id="325" r:id="rId12"/>
   </p:sldIdLst>
   <p:sldSz cx="12192000" cy="6858000"/>
   <p:notesSz cx="6881813" cy="9296400"/>
@@ -212,7 +207,7 @@
           <a:p>
             <a:fld id="{579ADD8C-C34C-4E7D-B105-F852DC1529D5}" type="datetimeFigureOut">
               <a:rPr lang="en-US" smtClean="0"/>
-              <a:t>3/22/2017</a:t>
+              <a:t>3/29/2017</a:t>
             </a:fld>
             <a:endParaRPr lang="en-US"/>
           </a:p>
@@ -836,7 +831,7 @@
           <a:p>
             <a:fld id="{966DB059-85A2-44BB-8624-18CEA9486879}" type="datetimeFigureOut">
               <a:rPr lang="en-US" smtClean="0"/>
-              <a:t>3/22/2017</a:t>
+              <a:t>3/29/2017</a:t>
             </a:fld>
             <a:endParaRPr lang="en-US"/>
           </a:p>
@@ -6548,265 +6543,6 @@
 </p:sld>
 </file>
 
-<file path=ppt/slides/slide10.xml><?xml version="1.0" encoding="utf-8"?>
-<p:sld xmlns:a="http://schemas.openxmlformats.org/drawingml/2006/main" xmlns:r="http://schemas.openxmlformats.org/officeDocument/2006/relationships" xmlns:p="http://schemas.openxmlformats.org/presentationml/2006/main">
-  <p:cSld>
-    <p:spTree>
-      <p:nvGrpSpPr>
-        <p:cNvPr id="1" name=""/>
-        <p:cNvGrpSpPr/>
-        <p:nvPr/>
-      </p:nvGrpSpPr>
-      <p:grpSpPr>
-        <a:xfrm>
-          <a:off x="0" y="0"/>
-          <a:ext cx="0" cy="0"/>
-          <a:chOff x="0" y="0"/>
-          <a:chExt cx="0" cy="0"/>
-        </a:xfrm>
-      </p:grpSpPr>
-      <p:sp>
-        <p:nvSpPr>
-          <p:cNvPr id="2" name="Title 1"/>
-          <p:cNvSpPr>
-            <a:spLocks noGrp="1"/>
-          </p:cNvSpPr>
-          <p:nvPr>
-            <p:ph type="title"/>
-          </p:nvPr>
-        </p:nvSpPr>
-        <p:spPr/>
-        <p:txBody>
-          <a:bodyPr/>
-          <a:lstStyle/>
-          <a:p>
-            <a:r>
-              <a:rPr lang="en-US" cap="none" dirty="0"/>
-              <a:t>ModifyDepartment</a:t>
-            </a:r>
-          </a:p>
-        </p:txBody>
-      </p:sp>
-      <p:sp>
-        <p:nvSpPr>
-          <p:cNvPr id="3" name="Text Placeholder 2"/>
-          <p:cNvSpPr>
-            <a:spLocks noGrp="1"/>
-          </p:cNvSpPr>
-          <p:nvPr>
-            <p:ph type="body" idx="1"/>
-          </p:nvPr>
-        </p:nvSpPr>
-        <p:spPr/>
-        <p:txBody>
-          <a:bodyPr/>
-          <a:lstStyle/>
-          <a:p>
-            <a:endParaRPr lang="en-US" dirty="0"/>
-          </a:p>
-        </p:txBody>
-      </p:sp>
-    </p:spTree>
-    <p:extLst>
-      <p:ext uri="{BB962C8B-B14F-4D97-AF65-F5344CB8AC3E}">
-        <p14:creationId xmlns:p14="http://schemas.microsoft.com/office/powerpoint/2010/main" val="3513565752"/>
-      </p:ext>
-    </p:extLst>
-  </p:cSld>
-  <p:clrMapOvr>
-    <a:masterClrMapping/>
-  </p:clrMapOvr>
-</p:sld>
-</file>
-
-<file path=ppt/slides/slide11.xml><?xml version="1.0" encoding="utf-8"?>
-<p:sld xmlns:a="http://schemas.openxmlformats.org/drawingml/2006/main" xmlns:r="http://schemas.openxmlformats.org/officeDocument/2006/relationships" xmlns:p="http://schemas.openxmlformats.org/presentationml/2006/main">
-  <p:cSld>
-    <p:spTree>
-      <p:nvGrpSpPr>
-        <p:cNvPr id="1" name=""/>
-        <p:cNvGrpSpPr/>
-        <p:nvPr/>
-      </p:nvGrpSpPr>
-      <p:grpSpPr>
-        <a:xfrm>
-          <a:off x="0" y="0"/>
-          <a:ext cx="0" cy="0"/>
-          <a:chOff x="0" y="0"/>
-          <a:chExt cx="0" cy="0"/>
-        </a:xfrm>
-      </p:grpSpPr>
-      <p:pic>
-        <p:nvPicPr>
-          <p:cNvPr id="2" name="Content Placeholder 1"/>
-          <p:cNvPicPr>
-            <a:picLocks noGrp="1" noChangeAspect="1"/>
-          </p:cNvPicPr>
-          <p:nvPr>
-            <p:ph idx="1"/>
-          </p:nvPr>
-        </p:nvPicPr>
-        <p:blipFill>
-          <a:blip r:embed="rId2"/>
-          <a:stretch>
-            <a:fillRect/>
-          </a:stretch>
-        </p:blipFill>
-        <p:spPr>
-          <a:xfrm>
-            <a:off x="2672080" y="1024304"/>
-            <a:ext cx="6024880" cy="5604540"/>
-          </a:xfrm>
-          <a:prstGeom prst="rect">
-            <a:avLst/>
-          </a:prstGeom>
-        </p:spPr>
-      </p:pic>
-      <p:sp>
-        <p:nvSpPr>
-          <p:cNvPr id="4" name="Title 1"/>
-          <p:cNvSpPr>
-            <a:spLocks noGrp="1"/>
-          </p:cNvSpPr>
-          <p:nvPr>
-            <p:ph type="title"/>
-          </p:nvPr>
-        </p:nvSpPr>
-        <p:spPr/>
-        <p:txBody>
-          <a:bodyPr>
-            <a:normAutofit/>
-          </a:bodyPr>
-          <a:lstStyle/>
-          <a:p>
-            <a:r>
-              <a:rPr lang="en-US" sz="2000" cap="none" dirty="0"/>
-              <a:t>ModifyDepartment</a:t>
-            </a:r>
-          </a:p>
-        </p:txBody>
-      </p:sp>
-    </p:spTree>
-    <p:extLst>
-      <p:ext uri="{BB962C8B-B14F-4D97-AF65-F5344CB8AC3E}">
-        <p14:creationId xmlns:p14="http://schemas.microsoft.com/office/powerpoint/2010/main" val="280429157"/>
-      </p:ext>
-    </p:extLst>
-  </p:cSld>
-  <p:clrMapOvr>
-    <a:masterClrMapping/>
-  </p:clrMapOvr>
-</p:sld>
-</file>
-
-<file path=ppt/slides/slide12.xml><?xml version="1.0" encoding="utf-8"?>
-<p:sld xmlns:a="http://schemas.openxmlformats.org/drawingml/2006/main" xmlns:r="http://schemas.openxmlformats.org/officeDocument/2006/relationships" xmlns:p="http://schemas.openxmlformats.org/presentationml/2006/main">
-  <p:cSld>
-    <p:spTree>
-      <p:nvGrpSpPr>
-        <p:cNvPr id="1" name=""/>
-        <p:cNvGrpSpPr/>
-        <p:nvPr/>
-      </p:nvGrpSpPr>
-      <p:grpSpPr>
-        <a:xfrm>
-          <a:off x="0" y="0"/>
-          <a:ext cx="0" cy="0"/>
-          <a:chOff x="0" y="0"/>
-          <a:chExt cx="0" cy="0"/>
-        </a:xfrm>
-      </p:grpSpPr>
-      <p:sp>
-        <p:nvSpPr>
-          <p:cNvPr id="3" name="Content Placeholder 2"/>
-          <p:cNvSpPr>
-            <a:spLocks noGrp="1"/>
-          </p:cNvSpPr>
-          <p:nvPr>
-            <p:ph idx="1"/>
-          </p:nvPr>
-        </p:nvSpPr>
-        <p:spPr/>
-        <p:txBody>
-          <a:bodyPr>
-            <a:normAutofit/>
-          </a:bodyPr>
-          <a:lstStyle/>
-          <a:p>
-            <a:endParaRPr lang="en-US" u="sng" dirty="0"/>
-          </a:p>
-          <a:p>
-            <a:endParaRPr lang="en-US" b="1" dirty="0"/>
-          </a:p>
-          <a:p>
-            <a:pPr marL="0" indent="0">
-              <a:buNone/>
-            </a:pPr>
-            <a:endParaRPr lang="en-US" b="1" dirty="0"/>
-          </a:p>
-        </p:txBody>
-      </p:sp>
-      <p:sp>
-        <p:nvSpPr>
-          <p:cNvPr id="4" name="Title 1"/>
-          <p:cNvSpPr>
-            <a:spLocks noGrp="1"/>
-          </p:cNvSpPr>
-          <p:nvPr>
-            <p:ph type="title"/>
-          </p:nvPr>
-        </p:nvSpPr>
-        <p:spPr/>
-        <p:txBody>
-          <a:bodyPr>
-            <a:normAutofit/>
-          </a:bodyPr>
-          <a:lstStyle/>
-          <a:p>
-            <a:r>
-              <a:rPr lang="en-US" sz="2000" cap="none" dirty="0"/>
-              <a:t>ModifyDepartment (Failure)</a:t>
-            </a:r>
-          </a:p>
-        </p:txBody>
-      </p:sp>
-      <p:pic>
-        <p:nvPicPr>
-          <p:cNvPr id="2" name="Picture 1"/>
-          <p:cNvPicPr>
-            <a:picLocks noChangeAspect="1"/>
-          </p:cNvPicPr>
-          <p:nvPr/>
-        </p:nvPicPr>
-        <p:blipFill>
-          <a:blip r:embed="rId2"/>
-          <a:stretch>
-            <a:fillRect/>
-          </a:stretch>
-        </p:blipFill>
-        <p:spPr>
-          <a:xfrm>
-            <a:off x="2519680" y="1055495"/>
-            <a:ext cx="6423342" cy="5671059"/>
-          </a:xfrm>
-          <a:prstGeom prst="rect">
-            <a:avLst/>
-          </a:prstGeom>
-        </p:spPr>
-      </p:pic>
-    </p:spTree>
-    <p:extLst>
-      <p:ext uri="{BB962C8B-B14F-4D97-AF65-F5344CB8AC3E}">
-        <p14:creationId xmlns:p14="http://schemas.microsoft.com/office/powerpoint/2010/main" val="2979988233"/>
-      </p:ext>
-    </p:extLst>
-  </p:cSld>
-  <p:clrMapOvr>
-    <a:masterClrMapping/>
-  </p:clrMapOvr>
-</p:sld>
-</file>
-
 <file path=ppt/slides/slide2.xml><?xml version="1.0" encoding="utf-8"?>
 <p:sld xmlns:a="http://schemas.openxmlformats.org/drawingml/2006/main" xmlns:r="http://schemas.openxmlformats.org/officeDocument/2006/relationships" xmlns:p="http://schemas.openxmlformats.org/presentationml/2006/main">
   <p:cSld>
@@ -7295,7 +7031,7 @@
           <a:p>
             <a:r>
               <a:rPr lang="en-US" cap="none" dirty="0"/>
-              <a:t>New and Updated Use Case Descriptions</a:t>
+              <a:t>Use Cases</a:t>
             </a:r>
           </a:p>
         </p:txBody>
@@ -7322,7 +7058,7 @@
     </p:spTree>
     <p:extLst>
       <p:ext uri="{BB962C8B-B14F-4D97-AF65-F5344CB8AC3E}">
-        <p14:creationId xmlns:p14="http://schemas.microsoft.com/office/powerpoint/2010/main" val="1396461693"/>
+        <p14:creationId xmlns:p14="http://schemas.microsoft.com/office/powerpoint/2010/main" val="2706352651"/>
       </p:ext>
     </p:extLst>
   </p:cSld>
@@ -7351,28 +7087,6 @@
       </p:grpSpPr>
       <p:sp>
         <p:nvSpPr>
-          <p:cNvPr id="2" name="Title 1"/>
-          <p:cNvSpPr>
-            <a:spLocks noGrp="1"/>
-          </p:cNvSpPr>
-          <p:nvPr>
-            <p:ph type="title"/>
-          </p:nvPr>
-        </p:nvSpPr>
-        <p:spPr/>
-        <p:txBody>
-          <a:bodyPr/>
-          <a:lstStyle/>
-          <a:p>
-            <a:r>
-              <a:rPr lang="en-US" cap="none" dirty="0"/>
-              <a:t>CreateDepartment</a:t>
-            </a:r>
-          </a:p>
-        </p:txBody>
-      </p:sp>
-      <p:sp>
-        <p:nvSpPr>
           <p:cNvPr id="3" name="Text Placeholder 2"/>
           <p:cNvSpPr>
             <a:spLocks noGrp="1"/>
@@ -7381,179 +7095,263 @@
             <p:ph type="body" idx="1"/>
           </p:nvPr>
         </p:nvSpPr>
-        <p:spPr/>
-        <p:txBody>
-          <a:bodyPr/>
-          <a:lstStyle/>
-          <a:p>
-            <a:endParaRPr lang="en-US" dirty="0"/>
-          </a:p>
-        </p:txBody>
-      </p:sp>
-    </p:spTree>
-    <p:extLst>
-      <p:ext uri="{BB962C8B-B14F-4D97-AF65-F5344CB8AC3E}">
-        <p14:creationId xmlns:p14="http://schemas.microsoft.com/office/powerpoint/2010/main" val="2608454212"/>
-      </p:ext>
-    </p:extLst>
-  </p:cSld>
-  <p:clrMapOvr>
-    <a:masterClrMapping/>
-  </p:clrMapOvr>
-</p:sld>
-</file>
-
-<file path=ppt/slides/slide8.xml><?xml version="1.0" encoding="utf-8"?>
-<p:sld xmlns:a="http://schemas.openxmlformats.org/drawingml/2006/main" xmlns:r="http://schemas.openxmlformats.org/officeDocument/2006/relationships" xmlns:p="http://schemas.openxmlformats.org/presentationml/2006/main">
-  <p:cSld>
-    <p:spTree>
-      <p:nvGrpSpPr>
-        <p:cNvPr id="1" name=""/>
-        <p:cNvGrpSpPr/>
-        <p:nvPr/>
-      </p:nvGrpSpPr>
-      <p:grpSpPr>
-        <a:xfrm>
-          <a:off x="0" y="0"/>
-          <a:ext cx="0" cy="0"/>
-          <a:chOff x="0" y="0"/>
-          <a:chExt cx="0" cy="0"/>
-        </a:xfrm>
-      </p:grpSpPr>
-      <p:sp>
-        <p:nvSpPr>
-          <p:cNvPr id="4" name="Title 1"/>
-          <p:cNvSpPr>
-            <a:spLocks noGrp="1"/>
-          </p:cNvSpPr>
-          <p:nvPr>
-            <p:ph type="title"/>
-          </p:nvPr>
-        </p:nvSpPr>
-        <p:spPr/>
+        <p:spPr>
+          <a:xfrm>
+            <a:off x="557530" y="1206183"/>
+            <a:ext cx="10515600" cy="1500187"/>
+          </a:xfrm>
+        </p:spPr>
         <p:txBody>
           <a:bodyPr>
-            <a:normAutofit/>
+            <a:normAutofit fontScale="85000" lnSpcReduction="20000"/>
           </a:bodyPr>
           <a:lstStyle/>
           <a:p>
-            <a:r>
-              <a:rPr lang="en-US" sz="2000" cap="none" dirty="0"/>
-              <a:t>CreateDepartment</a:t>
-            </a:r>
-          </a:p>
-        </p:txBody>
-      </p:sp>
-      <p:pic>
-        <p:nvPicPr>
-          <p:cNvPr id="10" name="Content Placeholder 9"/>
-          <p:cNvPicPr>
-            <a:picLocks noGrp="1" noChangeAspect="1"/>
-          </p:cNvPicPr>
-          <p:nvPr>
-            <p:ph idx="1"/>
-          </p:nvPr>
-        </p:nvPicPr>
-        <p:blipFill>
-          <a:blip r:embed="rId2"/>
-          <a:stretch>
-            <a:fillRect/>
-          </a:stretch>
-        </p:blipFill>
+            <a:pPr marL="342900" indent="-342900">
+              <a:buFontTx/>
+              <a:buChar char="-"/>
+            </a:pPr>
+            <a:r>
+              <a:rPr lang="en-US" dirty="0"/>
+              <a:t>Implemented:</a:t>
+            </a:r>
+          </a:p>
+          <a:p>
+            <a:pPr marL="800100" lvl="1" indent="-342900">
+              <a:buFontTx/>
+              <a:buChar char="-"/>
+            </a:pPr>
+            <a:r>
+              <a:rPr lang="en-US" dirty="0"/>
+              <a:t>Supervisor’s managed Department(s)</a:t>
+            </a:r>
+          </a:p>
+          <a:p>
+            <a:pPr marL="800100" lvl="1" indent="-342900">
+              <a:buFontTx/>
+              <a:buChar char="-"/>
+            </a:pPr>
+            <a:r>
+              <a:rPr lang="en-US" dirty="0"/>
+              <a:t>Supervisor’s managed Employee(s)</a:t>
+            </a:r>
+          </a:p>
+          <a:p>
+            <a:pPr marL="800100" lvl="1" indent="-342900">
+              <a:buFontTx/>
+              <a:buChar char="-"/>
+            </a:pPr>
+            <a:r>
+              <a:rPr lang="en-US" dirty="0"/>
+              <a:t>Supervisor’s Goals</a:t>
+            </a:r>
+          </a:p>
+          <a:p>
+            <a:pPr marL="800100" lvl="1" indent="-342900">
+              <a:buFontTx/>
+              <a:buChar char="-"/>
+            </a:pPr>
+            <a:r>
+              <a:rPr lang="en-US"/>
+              <a:t>Supervisor’s </a:t>
+            </a:r>
+            <a:endParaRPr lang="en-US" dirty="0"/>
+          </a:p>
+        </p:txBody>
+      </p:sp>
+      <p:sp>
+        <p:nvSpPr>
+          <p:cNvPr id="5" name="Text Placeholder 2"/>
+          <p:cNvSpPr txBox="1">
+            <a:spLocks/>
+          </p:cNvSpPr>
+          <p:nvPr/>
+        </p:nvSpPr>
         <p:spPr>
           <a:xfrm>
-            <a:off x="2255446" y="1053148"/>
-            <a:ext cx="6400361" cy="5713412"/>
+            <a:off x="557530" y="456089"/>
+            <a:ext cx="10515600" cy="458311"/>
           </a:xfrm>
           <a:prstGeom prst="rect">
             <a:avLst/>
           </a:prstGeom>
         </p:spPr>
-      </p:pic>
+        <p:txBody>
+          <a:bodyPr vert="horz" lIns="91440" tIns="45720" rIns="91440" bIns="45720" rtlCol="0">
+            <a:normAutofit/>
+          </a:bodyPr>
+          <a:lstStyle>
+            <a:lvl1pPr marL="0" indent="0" algn="l" defTabSz="228508" rtl="0" eaLnBrk="1" latinLnBrk="0" hangingPunct="1">
+              <a:spcBef>
+                <a:spcPct val="20000"/>
+              </a:spcBef>
+              <a:buFont typeface="Arial"/>
+              <a:buNone/>
+              <a:defRPr sz="2400" kern="1200">
+                <a:solidFill>
+                  <a:schemeClr val="tx1">
+                    <a:tint val="75000"/>
+                  </a:schemeClr>
+                </a:solidFill>
+                <a:latin typeface="Roboto Medium"/>
+                <a:ea typeface="+mn-ea"/>
+                <a:cs typeface="+mn-cs"/>
+              </a:defRPr>
+            </a:lvl1pPr>
+            <a:lvl2pPr marL="457200" indent="0" algn="l" defTabSz="228508" rtl="0" eaLnBrk="1" latinLnBrk="0" hangingPunct="1">
+              <a:spcBef>
+                <a:spcPct val="20000"/>
+              </a:spcBef>
+              <a:buSzPct val="60000"/>
+              <a:buFont typeface="Lucida Grande"/>
+              <a:buNone/>
+              <a:defRPr sz="2000" kern="1200">
+                <a:solidFill>
+                  <a:schemeClr val="tx1">
+                    <a:tint val="75000"/>
+                  </a:schemeClr>
+                </a:solidFill>
+                <a:latin typeface="Roboto Medium"/>
+                <a:ea typeface="+mn-ea"/>
+                <a:cs typeface="+mn-cs"/>
+              </a:defRPr>
+            </a:lvl2pPr>
+            <a:lvl3pPr marL="914400" indent="0" algn="l" defTabSz="228508" rtl="0" eaLnBrk="1" latinLnBrk="0" hangingPunct="1">
+              <a:spcBef>
+                <a:spcPct val="20000"/>
+              </a:spcBef>
+              <a:buSzPct val="60000"/>
+              <a:buFont typeface="Lucida Grande"/>
+              <a:buNone/>
+              <a:defRPr sz="1800" kern="1200">
+                <a:solidFill>
+                  <a:schemeClr val="tx1">
+                    <a:tint val="75000"/>
+                  </a:schemeClr>
+                </a:solidFill>
+                <a:latin typeface="Roboto Medium"/>
+                <a:ea typeface="+mn-ea"/>
+                <a:cs typeface="+mn-cs"/>
+              </a:defRPr>
+            </a:lvl3pPr>
+            <a:lvl4pPr marL="1371600" indent="0" algn="l" defTabSz="228508" rtl="0" eaLnBrk="1" latinLnBrk="0" hangingPunct="1">
+              <a:spcBef>
+                <a:spcPct val="20000"/>
+              </a:spcBef>
+              <a:buSzPct val="60000"/>
+              <a:buFont typeface="Lucida Grande"/>
+              <a:buNone/>
+              <a:defRPr sz="1600" kern="1200">
+                <a:solidFill>
+                  <a:schemeClr val="tx1">
+                    <a:tint val="75000"/>
+                  </a:schemeClr>
+                </a:solidFill>
+                <a:latin typeface="Roboto Medium"/>
+                <a:ea typeface="+mn-ea"/>
+                <a:cs typeface="+mn-cs"/>
+              </a:defRPr>
+            </a:lvl4pPr>
+            <a:lvl5pPr marL="1828800" indent="0" algn="l" defTabSz="228508" rtl="0" eaLnBrk="1" latinLnBrk="0" hangingPunct="1">
+              <a:spcBef>
+                <a:spcPct val="20000"/>
+              </a:spcBef>
+              <a:buSzPct val="60000"/>
+              <a:buFont typeface="Lucida Grande"/>
+              <a:buNone/>
+              <a:defRPr sz="1600" kern="1200">
+                <a:solidFill>
+                  <a:schemeClr val="tx1">
+                    <a:tint val="75000"/>
+                  </a:schemeClr>
+                </a:solidFill>
+                <a:latin typeface="Roboto Medium"/>
+                <a:ea typeface="+mn-ea"/>
+                <a:cs typeface="+mn-cs"/>
+              </a:defRPr>
+            </a:lvl5pPr>
+            <a:lvl6pPr marL="2286000" indent="0" algn="l" defTabSz="228508" rtl="0" eaLnBrk="1" latinLnBrk="0" hangingPunct="1">
+              <a:spcBef>
+                <a:spcPct val="20000"/>
+              </a:spcBef>
+              <a:buFont typeface="Arial"/>
+              <a:buNone/>
+              <a:defRPr sz="1600" kern="1200">
+                <a:solidFill>
+                  <a:schemeClr val="tx1">
+                    <a:tint val="75000"/>
+                  </a:schemeClr>
+                </a:solidFill>
+                <a:latin typeface="+mn-lt"/>
+                <a:ea typeface="+mn-ea"/>
+                <a:cs typeface="+mn-cs"/>
+              </a:defRPr>
+            </a:lvl6pPr>
+            <a:lvl7pPr marL="2743200" indent="0" algn="l" defTabSz="228508" rtl="0" eaLnBrk="1" latinLnBrk="0" hangingPunct="1">
+              <a:spcBef>
+                <a:spcPct val="20000"/>
+              </a:spcBef>
+              <a:buFont typeface="Arial"/>
+              <a:buNone/>
+              <a:defRPr sz="1600" kern="1200">
+                <a:solidFill>
+                  <a:schemeClr val="tx1">
+                    <a:tint val="75000"/>
+                  </a:schemeClr>
+                </a:solidFill>
+                <a:latin typeface="+mn-lt"/>
+                <a:ea typeface="+mn-ea"/>
+                <a:cs typeface="+mn-cs"/>
+              </a:defRPr>
+            </a:lvl7pPr>
+            <a:lvl8pPr marL="3200400" indent="0" algn="l" defTabSz="228508" rtl="0" eaLnBrk="1" latinLnBrk="0" hangingPunct="1">
+              <a:spcBef>
+                <a:spcPct val="20000"/>
+              </a:spcBef>
+              <a:buFont typeface="Arial"/>
+              <a:buNone/>
+              <a:defRPr sz="1600" kern="1200">
+                <a:solidFill>
+                  <a:schemeClr val="tx1">
+                    <a:tint val="75000"/>
+                  </a:schemeClr>
+                </a:solidFill>
+                <a:latin typeface="+mn-lt"/>
+                <a:ea typeface="+mn-ea"/>
+                <a:cs typeface="+mn-cs"/>
+              </a:defRPr>
+            </a:lvl8pPr>
+            <a:lvl9pPr marL="3657600" indent="0" algn="l" defTabSz="228508" rtl="0" eaLnBrk="1" latinLnBrk="0" hangingPunct="1">
+              <a:spcBef>
+                <a:spcPct val="20000"/>
+              </a:spcBef>
+              <a:buFont typeface="Arial"/>
+              <a:buNone/>
+              <a:defRPr sz="1600" kern="1200">
+                <a:solidFill>
+                  <a:schemeClr val="tx1">
+                    <a:tint val="75000"/>
+                  </a:schemeClr>
+                </a:solidFill>
+                <a:latin typeface="+mn-lt"/>
+                <a:ea typeface="+mn-ea"/>
+                <a:cs typeface="+mn-cs"/>
+              </a:defRPr>
+            </a:lvl9pPr>
+          </a:lstStyle>
+          <a:p>
+            <a:r>
+              <a:rPr lang="en-US" dirty="0" err="1"/>
+              <a:t>SupervisorHome</a:t>
+            </a:r>
+            <a:endParaRPr lang="en-US" dirty="0"/>
+          </a:p>
+        </p:txBody>
+      </p:sp>
     </p:spTree>
     <p:extLst>
       <p:ext uri="{BB962C8B-B14F-4D97-AF65-F5344CB8AC3E}">
-        <p14:creationId xmlns:p14="http://schemas.microsoft.com/office/powerpoint/2010/main" val="1406626138"/>
-      </p:ext>
-    </p:extLst>
-  </p:cSld>
-  <p:clrMapOvr>
-    <a:masterClrMapping/>
-  </p:clrMapOvr>
-</p:sld>
-</file>
-
-<file path=ppt/slides/slide9.xml><?xml version="1.0" encoding="utf-8"?>
-<p:sld xmlns:a="http://schemas.openxmlformats.org/drawingml/2006/main" xmlns:r="http://schemas.openxmlformats.org/officeDocument/2006/relationships" xmlns:p="http://schemas.openxmlformats.org/presentationml/2006/main">
-  <p:cSld>
-    <p:spTree>
-      <p:nvGrpSpPr>
-        <p:cNvPr id="1" name=""/>
-        <p:cNvGrpSpPr/>
-        <p:nvPr/>
-      </p:nvGrpSpPr>
-      <p:grpSpPr>
-        <a:xfrm>
-          <a:off x="0" y="0"/>
-          <a:ext cx="0" cy="0"/>
-          <a:chOff x="0" y="0"/>
-          <a:chExt cx="0" cy="0"/>
-        </a:xfrm>
-      </p:grpSpPr>
-      <p:pic>
-        <p:nvPicPr>
-          <p:cNvPr id="2" name="Content Placeholder 1"/>
-          <p:cNvPicPr>
-            <a:picLocks noGrp="1" noChangeAspect="1"/>
-          </p:cNvPicPr>
-          <p:nvPr>
-            <p:ph idx="1"/>
-          </p:nvPr>
-        </p:nvPicPr>
-        <p:blipFill>
-          <a:blip r:embed="rId2"/>
-          <a:stretch>
-            <a:fillRect/>
-          </a:stretch>
-        </p:blipFill>
-        <p:spPr>
-          <a:xfrm>
-            <a:off x="2428240" y="1042988"/>
-            <a:ext cx="6223197" cy="5616834"/>
-          </a:xfrm>
-          <a:prstGeom prst="rect">
-            <a:avLst/>
-          </a:prstGeom>
-        </p:spPr>
-      </p:pic>
-      <p:sp>
-        <p:nvSpPr>
-          <p:cNvPr id="4" name="Title 1"/>
-          <p:cNvSpPr>
-            <a:spLocks noGrp="1"/>
-          </p:cNvSpPr>
-          <p:nvPr>
-            <p:ph type="title"/>
-          </p:nvPr>
-        </p:nvSpPr>
-        <p:spPr/>
-        <p:txBody>
-          <a:bodyPr>
-            <a:normAutofit/>
-          </a:bodyPr>
-          <a:lstStyle/>
-          <a:p>
-            <a:r>
-              <a:rPr lang="en-US" sz="2000" cap="none" dirty="0"/>
-              <a:t>CreateDepartment (Failure)</a:t>
-            </a:r>
-          </a:p>
-        </p:txBody>
-      </p:sp>
-    </p:spTree>
-    <p:extLst>
-      <p:ext uri="{BB962C8B-B14F-4D97-AF65-F5344CB8AC3E}">
-        <p14:creationId xmlns:p14="http://schemas.microsoft.com/office/powerpoint/2010/main" val="3580051433"/>
+        <p14:creationId xmlns:p14="http://schemas.microsoft.com/office/powerpoint/2010/main" val="228029945"/>
       </p:ext>
     </p:extLst>
   </p:cSld>

</xml_diff>